<commit_message>
1-1. MoviewReview 제대로된 commit 1. Training 시켰 2. Model도 뽑았다. 3. Evaluate로 검사도 했다.
문제점
1. 실제 적용해보면 50퍼센트 가까이 맞춘다..
2. 저장된 모델을 로드해서 Evaluate하면 정확도가 낮아진다..

해결방범
1. 이리저리 찾아봤는데 모르겠다...
</commit_message>
<xml_diff>
--- a/describes/영화 리뷰 트레이닝.pptx
+++ b/describes/영화 리뷰 트레이닝.pptx
@@ -3930,11 +3930,7 @@
           <a:p>
             <a:r>
               <a:rPr lang="en-US" altLang="ko-KR" dirty="0" smtClean="0"/>
-              <a:t>4</a:t>
-            </a:r>
-            <a:r>
-              <a:rPr lang="en-US" altLang="ko-KR" dirty="0" smtClean="0"/>
-              <a:t>. </a:t>
+              <a:t>4. </a:t>
             </a:r>
             <a:r>
               <a:rPr lang="ko-KR" altLang="en-US" dirty="0" smtClean="0"/>
@@ -3952,7 +3948,6 @@
               <a:rPr lang="en-US" altLang="ko-KR" dirty="0" smtClean="0"/>
               <a:t>)</a:t>
             </a:r>
-            <a:endParaRPr lang="en-US" altLang="ko-KR" dirty="0" smtClean="0"/>
           </a:p>
         </p:txBody>
       </p:sp>
@@ -4226,7 +4221,6 @@
               <a:rPr lang="en-US" altLang="ko-KR" dirty="0" smtClean="0"/>
               <a:t>)</a:t>
             </a:r>
-            <a:endParaRPr lang="en-US" altLang="ko-KR" dirty="0" smtClean="0"/>
           </a:p>
         </p:txBody>
       </p:sp>
@@ -4522,7 +4516,7 @@
         </p:nvSpPr>
         <p:spPr>
           <a:xfrm>
-            <a:off x="1281869" y="820396"/>
+            <a:off x="809834" y="852724"/>
             <a:ext cx="3546505" cy="369332"/>
           </a:xfrm>
           <a:prstGeom prst="rect">
@@ -4538,11 +4532,7 @@
           <a:p>
             <a:r>
               <a:rPr lang="en-US" altLang="ko-KR" dirty="0" smtClean="0"/>
-              <a:t>6</a:t>
-            </a:r>
-            <a:r>
-              <a:rPr lang="en-US" altLang="ko-KR" dirty="0" smtClean="0"/>
-              <a:t>. </a:t>
+              <a:t>6. </a:t>
             </a:r>
             <a:r>
               <a:rPr lang="ko-KR" altLang="en-US" dirty="0" smtClean="0"/>
@@ -4560,8 +4550,8 @@
         </p:nvSpPr>
         <p:spPr>
           <a:xfrm>
-            <a:off x="7034816" y="1845892"/>
-            <a:ext cx="4187440" cy="3416320"/>
+            <a:off x="6979398" y="2999626"/>
+            <a:ext cx="4187440" cy="923330"/>
           </a:xfrm>
           <a:prstGeom prst="rect">
             <a:avLst/>
@@ -4576,102 +4566,31 @@
           <a:p>
             <a:r>
               <a:rPr lang="ko-KR" altLang="en-US" dirty="0" smtClean="0"/>
-              <a:t>테스트 코드 또한 </a:t>
-            </a:r>
-            <a:r>
-              <a:rPr lang="en-US" altLang="ko-KR" dirty="0" err="1" smtClean="0"/>
-              <a:t>keras</a:t>
+              <a:t>실제로 모델을 가지고 </a:t>
+            </a:r>
+            <a:r>
+              <a:rPr lang="en-US" altLang="ko-KR" dirty="0" smtClean="0"/>
+              <a:t>test </a:t>
             </a:r>
             <a:r>
               <a:rPr lang="ko-KR" altLang="en-US" dirty="0" smtClean="0"/>
-              <a:t>에서 지원을 해주기 때문에 간단하게 표시 할 수 있습니다</a:t>
+              <a:t>데이터를 맞춰봤더니 </a:t>
+            </a:r>
+            <a:r>
+              <a:rPr lang="en-US" altLang="ko-KR" dirty="0" smtClean="0"/>
+              <a:t>53</a:t>
+            </a:r>
+            <a:r>
+              <a:rPr lang="ko-KR" altLang="en-US" dirty="0" smtClean="0"/>
+              <a:t>퍼센트의 정확도가 나왔습니다</a:t>
             </a:r>
             <a:r>
               <a:rPr lang="en-US" altLang="ko-KR" dirty="0" smtClean="0"/>
               <a:t>.</a:t>
             </a:r>
-          </a:p>
-          <a:p>
-            <a:endParaRPr lang="en-US" altLang="ko-KR" dirty="0" smtClean="0"/>
-          </a:p>
-          <a:p>
-            <a:r>
-              <a:rPr lang="en-US" altLang="ko-KR" dirty="0" smtClean="0"/>
-              <a:t>Training</a:t>
-            </a:r>
             <a:r>
               <a:rPr lang="ko-KR" altLang="en-US" dirty="0" smtClean="0"/>
-              <a:t>을 진행한 데이터 외에 따로 </a:t>
-            </a:r>
-            <a:r>
-              <a:rPr lang="en-US" altLang="ko-KR" dirty="0" smtClean="0"/>
-              <a:t>5</a:t>
-            </a:r>
-            <a:r>
-              <a:rPr lang="ko-KR" altLang="en-US" dirty="0" smtClean="0"/>
-              <a:t>만개의 데이터를 가지고 있고 </a:t>
-            </a:r>
-            <a:r>
-              <a:rPr lang="ko-KR" altLang="en-US" dirty="0" err="1" smtClean="0"/>
-              <a:t>전처리를</a:t>
-            </a:r>
-            <a:r>
-              <a:rPr lang="ko-KR" altLang="en-US" dirty="0" smtClean="0"/>
-              <a:t> 다 진행했습니다</a:t>
-            </a:r>
-            <a:r>
-              <a:rPr lang="en-US" altLang="ko-KR" dirty="0" smtClean="0"/>
-              <a:t>. </a:t>
-            </a:r>
-          </a:p>
-          <a:p>
-            <a:endParaRPr lang="en-US" altLang="ko-KR" dirty="0" smtClean="0"/>
-          </a:p>
-          <a:p>
-            <a:r>
-              <a:rPr lang="ko-KR" altLang="en-US" dirty="0" smtClean="0"/>
-              <a:t>그리고 이를 가지고 </a:t>
-            </a:r>
-            <a:r>
-              <a:rPr lang="en-US" altLang="ko-KR" dirty="0" smtClean="0"/>
-              <a:t>model</a:t>
-            </a:r>
-            <a:r>
-              <a:rPr lang="ko-KR" altLang="en-US" dirty="0" smtClean="0"/>
-              <a:t>을 이용해서 테스트를 진행해 보았습니다</a:t>
-            </a:r>
-            <a:r>
-              <a:rPr lang="en-US" altLang="ko-KR" dirty="0" smtClean="0"/>
-              <a:t>.</a:t>
-            </a:r>
-          </a:p>
-          <a:p>
-            <a:endParaRPr lang="en-US" altLang="ko-KR" dirty="0"/>
-          </a:p>
-          <a:p>
-            <a:r>
-              <a:rPr lang="ko-KR" altLang="en-US" dirty="0" smtClean="0"/>
-              <a:t>밑의 그림과 같이 정확도가 </a:t>
-            </a:r>
-            <a:r>
-              <a:rPr lang="en-US" altLang="ko-KR" dirty="0" smtClean="0"/>
-              <a:t>0.83</a:t>
-            </a:r>
-            <a:r>
-              <a:rPr lang="ko-KR" altLang="en-US" dirty="0" smtClean="0"/>
-              <a:t>가량 </a:t>
-            </a:r>
-            <a:r>
-              <a:rPr lang="ko-KR" altLang="en-US" dirty="0" err="1" smtClean="0"/>
-              <a:t>나오는것을</a:t>
-            </a:r>
-            <a:r>
-              <a:rPr lang="ko-KR" altLang="en-US" dirty="0" smtClean="0"/>
-              <a:t> 확인 할 수 있었습니다</a:t>
-            </a:r>
-            <a:r>
-              <a:rPr lang="en-US" altLang="ko-KR" dirty="0" smtClean="0"/>
-              <a:t>.</a:t>
+              <a:t> </a:t>
             </a:r>
             <a:endParaRPr lang="ko-KR" altLang="en-US" dirty="0"/>
           </a:p>
@@ -4679,133 +4598,28 @@
       </p:sp>
       <p:pic>
         <p:nvPicPr>
-          <p:cNvPr id="2" name="그림 1"/>
+          <p:cNvPr id="8" name="그림 7"/>
           <p:cNvPicPr>
             <a:picLocks noChangeAspect="1"/>
           </p:cNvPicPr>
           <p:nvPr/>
         </p:nvPicPr>
-        <p:blipFill rotWithShape="1">
+        <p:blipFill>
           <a:blip r:embed="rId2"/>
-          <a:srcRect t="59810" r="24366"/>
-          <a:stretch/>
+          <a:stretch>
+            <a:fillRect/>
+          </a:stretch>
         </p:blipFill>
         <p:spPr>
           <a:xfrm>
-            <a:off x="1270323" y="1830927"/>
-            <a:ext cx="5552901" cy="1243432"/>
+            <a:off x="809834" y="1845892"/>
+            <a:ext cx="5716497" cy="3230798"/>
           </a:xfrm>
           <a:prstGeom prst="rect">
             <a:avLst/>
           </a:prstGeom>
         </p:spPr>
       </p:pic>
-      <p:sp>
-        <p:nvSpPr>
-          <p:cNvPr id="4" name="타원 3"/>
-          <p:cNvSpPr/>
-          <p:nvPr/>
-        </p:nvSpPr>
-        <p:spPr>
-          <a:xfrm>
-            <a:off x="2085173" y="2341549"/>
-            <a:ext cx="4486542" cy="376015"/>
-          </a:xfrm>
-          <a:prstGeom prst="ellipse">
-            <a:avLst/>
-          </a:prstGeom>
-          <a:noFill/>
-        </p:spPr>
-        <p:style>
-          <a:lnRef idx="2">
-            <a:schemeClr val="accent1">
-              <a:shade val="50000"/>
-            </a:schemeClr>
-          </a:lnRef>
-          <a:fillRef idx="1">
-            <a:schemeClr val="accent1"/>
-          </a:fillRef>
-          <a:effectRef idx="0">
-            <a:schemeClr val="accent1"/>
-          </a:effectRef>
-          <a:fontRef idx="minor">
-            <a:schemeClr val="lt1"/>
-          </a:fontRef>
-        </p:style>
-        <p:txBody>
-          <a:bodyPr rtlCol="0" anchor="ctr"/>
-          <a:lstStyle/>
-          <a:p>
-            <a:pPr algn="ctr"/>
-            <a:endParaRPr lang="ko-KR" altLang="en-US"/>
-          </a:p>
-        </p:txBody>
-      </p:sp>
-      <p:pic>
-        <p:nvPicPr>
-          <p:cNvPr id="6" name="그림 5"/>
-          <p:cNvPicPr>
-            <a:picLocks noChangeAspect="1"/>
-          </p:cNvPicPr>
-          <p:nvPr/>
-        </p:nvPicPr>
-        <p:blipFill>
-          <a:blip r:embed="rId3"/>
-          <a:stretch>
-            <a:fillRect/>
-          </a:stretch>
-        </p:blipFill>
-        <p:spPr>
-          <a:xfrm>
-            <a:off x="1281869" y="3666146"/>
-            <a:ext cx="5529811" cy="1861386"/>
-          </a:xfrm>
-          <a:prstGeom prst="rect">
-            <a:avLst/>
-          </a:prstGeom>
-        </p:spPr>
-      </p:pic>
-      <p:sp>
-        <p:nvSpPr>
-          <p:cNvPr id="7" name="타원 6"/>
-          <p:cNvSpPr/>
-          <p:nvPr/>
-        </p:nvSpPr>
-        <p:spPr>
-          <a:xfrm>
-            <a:off x="1270323" y="5170206"/>
-            <a:ext cx="3694784" cy="341831"/>
-          </a:xfrm>
-          <a:prstGeom prst="ellipse">
-            <a:avLst/>
-          </a:prstGeom>
-          <a:noFill/>
-        </p:spPr>
-        <p:style>
-          <a:lnRef idx="2">
-            <a:schemeClr val="accent1">
-              <a:shade val="50000"/>
-            </a:schemeClr>
-          </a:lnRef>
-          <a:fillRef idx="1">
-            <a:schemeClr val="accent1"/>
-          </a:fillRef>
-          <a:effectRef idx="0">
-            <a:schemeClr val="accent1"/>
-          </a:effectRef>
-          <a:fontRef idx="minor">
-            <a:schemeClr val="lt1"/>
-          </a:fontRef>
-        </p:style>
-        <p:txBody>
-          <a:bodyPr rtlCol="0" anchor="ctr"/>
-          <a:lstStyle/>
-          <a:p>
-            <a:pPr algn="ctr"/>
-            <a:endParaRPr lang="ko-KR" altLang="en-US"/>
-          </a:p>
-        </p:txBody>
-      </p:sp>
     </p:spTree>
     <p:extLst>
       <p:ext uri="{BB962C8B-B14F-4D97-AF65-F5344CB8AC3E}">
@@ -5435,15 +5249,7 @@
           <a:p>
             <a:r>
               <a:rPr lang="ko-KR" altLang="en-US" sz="1600" dirty="0" smtClean="0"/>
-              <a:t>한국어를 제외한 모든 </a:t>
-            </a:r>
-            <a:r>
-              <a:rPr lang="ko-KR" altLang="en-US" sz="1600" dirty="0" smtClean="0"/>
-              <a:t>문자를 </a:t>
-            </a:r>
-            <a:r>
-              <a:rPr lang="ko-KR" altLang="en-US" sz="1600" dirty="0" smtClean="0"/>
-              <a:t>제거 합니다</a:t>
+              <a:t>한국어를 제외한 모든 문자를 제거 합니다</a:t>
             </a:r>
             <a:r>
               <a:rPr lang="en-US" altLang="ko-KR" sz="1600" dirty="0" smtClean="0"/>
@@ -5492,7 +5298,6 @@
               <a:rPr lang="en-US" altLang="ko-KR" sz="1600" dirty="0" smtClean="0"/>
               <a:t>”</a:t>
             </a:r>
-            <a:endParaRPr lang="en-US" altLang="ko-KR" sz="1600" dirty="0" smtClean="0"/>
           </a:p>
         </p:txBody>
       </p:sp>
@@ -5676,17 +5481,12 @@
             </a:r>
             <a:r>
               <a:rPr lang="ko-KR" altLang="en-US" sz="1600" dirty="0" smtClean="0"/>
-              <a:t>를 이용해 리뷰 문자를 모두 형태소 단위로 </a:t>
-            </a:r>
-            <a:r>
-              <a:rPr lang="ko-KR" altLang="en-US" sz="1600" dirty="0" smtClean="0"/>
-              <a:t>자르고 어간만 가져 옵니다</a:t>
+              <a:t>를 이용해 리뷰 문자를 모두 형태소 단위로 자르고 어간만 가져 옵니다</a:t>
             </a:r>
             <a:r>
               <a:rPr lang="en-US" altLang="ko-KR" sz="1600" dirty="0" smtClean="0"/>
               <a:t>.</a:t>
             </a:r>
-            <a:endParaRPr lang="en-US" altLang="ko-KR" sz="1600" dirty="0" smtClean="0"/>
           </a:p>
           <a:p>
             <a:r>
@@ -5699,11 +5499,7 @@
             </a:r>
             <a:r>
               <a:rPr lang="en-US" altLang="ko-KR" sz="1600" dirty="0" smtClean="0"/>
-              <a:t>’, </a:t>
-            </a:r>
-            <a:r>
-              <a:rPr lang="en-US" altLang="ko-KR" sz="1600" dirty="0" smtClean="0"/>
-              <a:t>‘</a:t>
+              <a:t>’, ‘</a:t>
             </a:r>
             <a:r>
               <a:rPr lang="ko-KR" altLang="en-US" sz="1600" dirty="0" smtClean="0"/>
@@ -5975,19 +5771,11 @@
           <a:p>
             <a:r>
               <a:rPr lang="ko-KR" altLang="en-US" sz="1600" dirty="0" err="1" smtClean="0"/>
-              <a:t>첫번째</a:t>
-            </a:r>
-            <a:r>
-              <a:rPr lang="ko-KR" altLang="en-US" sz="1600" dirty="0" err="1" smtClean="0"/>
-              <a:t>는</a:t>
+              <a:t>첫번째는</a:t>
             </a:r>
             <a:r>
               <a:rPr lang="ko-KR" altLang="en-US" sz="1600" dirty="0" smtClean="0"/>
-              <a:t> </a:t>
-            </a:r>
-            <a:r>
-              <a:rPr lang="ko-KR" altLang="en-US" sz="1600" dirty="0" smtClean="0"/>
-              <a:t>기계가 데이터를 잘 알아 볼 수 있도록 정수화 </a:t>
+              <a:t> 기계가 데이터를 잘 알아 볼 수 있도록 정수화 </a:t>
             </a:r>
             <a:r>
               <a:rPr lang="ko-KR" altLang="en-US" sz="1600" dirty="0" err="1" smtClean="0"/>
@@ -6308,11 +6096,7 @@
           <a:p>
             <a:r>
               <a:rPr lang="en-US" altLang="ko-KR" dirty="0" smtClean="0"/>
-              <a:t>3-1</a:t>
-            </a:r>
-            <a:r>
-              <a:rPr lang="en-US" altLang="ko-KR" dirty="0" smtClean="0"/>
-              <a:t>. </a:t>
+              <a:t>3-1. </a:t>
             </a:r>
             <a:r>
               <a:rPr lang="ko-KR" altLang="en-US" dirty="0"/>
@@ -6320,11 +6104,7 @@
             </a:r>
             <a:r>
               <a:rPr lang="en-US" altLang="ko-KR" dirty="0" smtClean="0"/>
-              <a:t>(</a:t>
-            </a:r>
-            <a:r>
-              <a:rPr lang="en-US" altLang="ko-KR" dirty="0" smtClean="0"/>
-              <a:t>Seq2Seq </a:t>
+              <a:t>(Seq2Seq </a:t>
             </a:r>
             <a:r>
               <a:rPr lang="ko-KR" altLang="en-US" dirty="0" smtClean="0"/>
@@ -6456,7 +6236,6 @@
               <a:rPr lang="en-US" altLang="ko-KR" sz="1400" dirty="0" smtClean="0"/>
               <a:t>.</a:t>
             </a:r>
-            <a:endParaRPr lang="en-US" altLang="ko-KR" sz="1400" dirty="0" smtClean="0"/>
           </a:p>
         </p:txBody>
       </p:sp>
@@ -6532,7 +6311,6 @@
               <a:rPr lang="en-US" altLang="ko-KR" dirty="0" smtClean="0"/>
               <a:t>)</a:t>
             </a:r>
-            <a:endParaRPr lang="en-US" altLang="ko-KR" dirty="0" smtClean="0"/>
           </a:p>
         </p:txBody>
       </p:sp>
@@ -8090,11 +7868,7 @@
             <a:p>
               <a:r>
                 <a:rPr lang="ko-KR" altLang="en-US" sz="1400" dirty="0" smtClean="0"/>
-                <a:t>나는 </a:t>
-              </a:r>
-              <a:r>
-                <a:rPr lang="ko-KR" altLang="en-US" sz="1400" dirty="0" smtClean="0"/>
-                <a:t>고양이다</a:t>
+                <a:t>나는 고양이다</a:t>
               </a:r>
               <a:endParaRPr lang="en-US" altLang="ko-KR" sz="1400" dirty="0" smtClean="0"/>
             </a:p>
@@ -8375,7 +8149,6 @@
               <a:rPr lang="en-US" altLang="ko-KR" dirty="0" smtClean="0"/>
               <a:t>)</a:t>
             </a:r>
-            <a:endParaRPr lang="en-US" altLang="ko-KR" dirty="0" smtClean="0"/>
           </a:p>
         </p:txBody>
       </p:sp>
@@ -8432,15 +8205,7 @@
             </a:r>
             <a:r>
               <a:rPr lang="en-US" altLang="ko-KR" dirty="0" smtClean="0"/>
-              <a:t>LSTM</a:t>
-            </a:r>
-            <a:r>
-              <a:rPr lang="en-US" altLang="ko-KR" dirty="0" smtClean="0"/>
-              <a:t>, </a:t>
-            </a:r>
-            <a:r>
-              <a:rPr lang="en-US" altLang="ko-KR" dirty="0" smtClean="0"/>
-              <a:t>Embedding layer, </a:t>
+              <a:t>LSTM, Embedding layer, </a:t>
             </a:r>
             <a:r>
               <a:rPr lang="en-US" altLang="ko-KR" dirty="0" err="1" smtClean="0"/>
@@ -8469,11 +8234,7 @@
             </a:r>
             <a:r>
               <a:rPr lang="en-US" altLang="ko-KR" dirty="0" smtClean="0"/>
-              <a:t>laye</a:t>
-            </a:r>
-            <a:r>
-              <a:rPr lang="en-US" altLang="ko-KR" dirty="0" smtClean="0"/>
-              <a:t>r </a:t>
+              <a:t>layer </a:t>
             </a:r>
             <a:r>
               <a:rPr lang="ko-KR" altLang="en-US" dirty="0" smtClean="0"/>

</xml_diff>